<commit_message>
Continued work on the "What is a DataStory" section.
</commit_message>
<xml_diff>
--- a/_ctsi/ctsi_presentation.pptx
+++ b/_ctsi/ctsi_presentation.pptx
@@ -11,7 +11,8 @@
     <p:sldId id="258" r:id="rId5"/>
     <p:sldId id="257" r:id="rId6"/>
     <p:sldId id="262" r:id="rId7"/>
-    <p:sldId id="260" r:id="rId8"/>
+    <p:sldId id="263" r:id="rId8"/>
+    <p:sldId id="260" r:id="rId9"/>
   </p:sldIdLst>
   <p:sldSz cx="12192000" cy="6858000"/>
   <p:notesSz cx="6858000" cy="9144000"/>
@@ -3489,7 +3490,31 @@
               <a:rPr lang="en-US" dirty="0" smtClean="0">
                 <a:latin typeface="+mj-lt"/>
               </a:rPr>
-              <a:t> Why </a:t>
+              <a:t> </a:t>
+            </a:r>
+            <a:r>
+              <a:rPr lang="en-US" dirty="0" smtClean="0">
+                <a:latin typeface="+mj-lt"/>
+              </a:rPr>
+              <a:t>A note of appreciation to our sponsors…</a:t>
+            </a:r>
+          </a:p>
+          <a:p>
+            <a:pPr>
+              <a:buFont typeface="Wingdings" panose="05000000000000000000" pitchFamily="2" charset="2"/>
+              <a:buChar char="v"/>
+            </a:pPr>
+            <a:r>
+              <a:rPr lang="en-US" dirty="0">
+                <a:latin typeface="+mj-lt"/>
+              </a:rPr>
+              <a:t> </a:t>
+            </a:r>
+            <a:r>
+              <a:rPr lang="en-US" dirty="0" smtClean="0">
+                <a:latin typeface="+mj-lt"/>
+              </a:rPr>
+              <a:t>Why </a:t>
             </a:r>
             <a:r>
               <a:rPr lang="en-US" dirty="0">
@@ -3549,13 +3574,7 @@
               <a:rPr lang="en-US" dirty="0" smtClean="0">
                 <a:latin typeface="+mj-lt"/>
               </a:rPr>
-              <a:t>will we determine if this new approach works</a:t>
-            </a:r>
-            <a:r>
-              <a:rPr lang="en-US" dirty="0" smtClean="0">
-                <a:latin typeface="+mj-lt"/>
-              </a:rPr>
-              <a:t>?</a:t>
+              <a:t>will we determine if this new approach works?</a:t>
             </a:r>
             <a:endParaRPr lang="en-US" dirty="0">
               <a:latin typeface="+mj-lt"/>
@@ -3627,7 +3646,23 @@
             <a:pPr algn="ctr"/>
             <a:r>
               <a:rPr lang="en-US" dirty="0" smtClean="0"/>
-              <a:t>The Data Deluge</a:t>
+              <a:t>Our students </a:t>
+            </a:r>
+            <a:r>
+              <a:rPr lang="en-US" dirty="0"/>
+              <a:t>f</a:t>
+            </a:r>
+            <a:r>
+              <a:rPr lang="en-US" dirty="0" smtClean="0"/>
+              <a:t>ace a data </a:t>
+            </a:r>
+            <a:r>
+              <a:rPr lang="en-US" dirty="0"/>
+              <a:t>d</a:t>
+            </a:r>
+            <a:r>
+              <a:rPr lang="en-US" dirty="0" smtClean="0"/>
+              <a:t>eluge…</a:t>
             </a:r>
             <a:endParaRPr lang="en-US" dirty="0"/>
           </a:p>
@@ -3635,7 +3670,7 @@
       </p:sp>
       <p:pic>
         <p:nvPicPr>
-          <p:cNvPr id="10" name="Content Placeholder 9"/>
+          <p:cNvPr id="6" name="Content Placeholder 5"/>
           <p:cNvPicPr>
             <a:picLocks noGrp="1" noChangeAspect="1"/>
           </p:cNvPicPr>
@@ -3657,18 +3692,9 @@
         </p:blipFill>
         <p:spPr>
           <a:xfrm>
-            <a:off x="3143250" y="2039144"/>
-            <a:ext cx="5905500" cy="3924300"/>
+            <a:off x="3079750" y="2026444"/>
+            <a:ext cx="6032500" cy="3949700"/>
           </a:xfrm>
-          <a:ln w="3175">
-            <a:solidFill>
-              <a:schemeClr val="tx1">
-                <a:lumMod val="75000"/>
-                <a:lumOff val="25000"/>
-                <a:alpha val="50000"/>
-              </a:schemeClr>
-            </a:solidFill>
-          </a:ln>
         </p:spPr>
       </p:pic>
     </p:spTree>
@@ -3725,7 +3751,7 @@
             <a:pPr algn="ctr"/>
             <a:r>
               <a:rPr lang="en-US" dirty="0" smtClean="0"/>
-              <a:t>Foundation Issues</a:t>
+              <a:t>…but what does their foundation look like? </a:t>
             </a:r>
             <a:endParaRPr lang="en-US" dirty="0"/>
           </a:p>
@@ -3829,7 +3855,7 @@
             <a:pPr algn="ctr"/>
             <a:r>
               <a:rPr lang="en-US" dirty="0" smtClean="0"/>
-              <a:t>Pedagogical Issues</a:t>
+              <a:t>And, how are we teaching them?</a:t>
             </a:r>
             <a:endParaRPr lang="en-US" dirty="0"/>
           </a:p>
@@ -3934,7 +3960,11 @@
             <a:pPr algn="ctr"/>
             <a:r>
               <a:rPr lang="en-US" dirty="0" smtClean="0"/>
-              <a:t>What is a DataStory?</a:t>
+              <a:t>So what </a:t>
+            </a:r>
+            <a:r>
+              <a:rPr lang="en-US" dirty="0" smtClean="0"/>
+              <a:t>is a DataStory?</a:t>
             </a:r>
             <a:endParaRPr lang="en-US" dirty="0"/>
           </a:p>
@@ -3952,12 +3982,14 @@
         </p:nvSpPr>
         <p:spPr>
           <a:xfrm>
-            <a:off x="838200" y="1825625"/>
-            <a:ext cx="10515600" cy="2713124"/>
+            <a:off x="838200" y="1825624"/>
+            <a:ext cx="10515600" cy="3267075"/>
           </a:xfrm>
         </p:spPr>
         <p:txBody>
-          <a:bodyPr/>
+          <a:bodyPr>
+            <a:normAutofit/>
+          </a:bodyPr>
           <a:lstStyle/>
           <a:p>
             <a:pPr marL="0" indent="0" algn="ctr">
@@ -3970,26 +4002,72 @@
               <a:buNone/>
             </a:pPr>
             <a:r>
-              <a:rPr lang="en-US" dirty="0" smtClean="0"/>
+              <a:rPr lang="en-US" dirty="0" smtClean="0">
+                <a:latin typeface="+mj-lt"/>
+              </a:rPr>
               <a:t>What </a:t>
             </a:r>
             <a:r>
-              <a:rPr lang="en-US" dirty="0"/>
+              <a:rPr lang="en-US" dirty="0">
+                <a:latin typeface="+mj-lt"/>
+              </a:rPr>
               <a:t>do you get when you cross a group of comic book characters with a dataset, basic statistics, and open-science tools?  You get a </a:t>
             </a:r>
             <a:r>
-              <a:rPr lang="en-US" b="1" dirty="0"/>
+              <a:rPr lang="en-US" b="1" dirty="0">
+                <a:latin typeface="+mj-lt"/>
+              </a:rPr>
               <a:t>data story</a:t>
             </a:r>
             <a:r>
-              <a:rPr lang="en-US" dirty="0"/>
-              <a:t>.  A data story – as its name suggests – is narrative about a data set with the primary objective of educating even as it </a:t>
-            </a:r>
-            <a:r>
-              <a:rPr lang="en-US" dirty="0" smtClean="0"/>
-              <a:t>engages the student by way of a story arc or narrative. </a:t>
-            </a:r>
-            <a:endParaRPr lang="en-US" dirty="0"/>
+              <a:rPr lang="en-US" dirty="0">
+                <a:latin typeface="+mj-lt"/>
+              </a:rPr>
+              <a:t>.  </a:t>
+            </a:r>
+            <a:endParaRPr lang="en-US" dirty="0">
+              <a:latin typeface="+mj-lt"/>
+            </a:endParaRPr>
+          </a:p>
+          <a:p>
+            <a:pPr marL="0" indent="0" algn="ctr">
+              <a:buNone/>
+            </a:pPr>
+            <a:endParaRPr lang="en-US" dirty="0" smtClean="0">
+              <a:latin typeface="+mj-lt"/>
+            </a:endParaRPr>
+          </a:p>
+          <a:p>
+            <a:pPr marL="0" indent="0" algn="ctr">
+              <a:buNone/>
+            </a:pPr>
+            <a:r>
+              <a:rPr lang="en-US" dirty="0" smtClean="0">
+                <a:latin typeface="+mj-lt"/>
+              </a:rPr>
+              <a:t>A </a:t>
+            </a:r>
+            <a:r>
+              <a:rPr lang="en-US" dirty="0">
+                <a:latin typeface="+mj-lt"/>
+              </a:rPr>
+              <a:t>data story – as its name suggests – is narrative about a data set with the primary objective of educating even as it </a:t>
+            </a:r>
+            <a:r>
+              <a:rPr lang="en-US" dirty="0" smtClean="0">
+                <a:latin typeface="+mj-lt"/>
+              </a:rPr>
+              <a:t>engages the </a:t>
+            </a:r>
+            <a:r>
+              <a:rPr lang="en-US" dirty="0" smtClean="0">
+                <a:latin typeface="+mj-lt"/>
+              </a:rPr>
+              <a:t>student in a journey through its narrative arc. </a:t>
+            </a:r>
+            <a:endParaRPr lang="en-US" dirty="0">
+              <a:latin typeface="+mj-lt"/>
+            </a:endParaRPr>
           </a:p>
         </p:txBody>
       </p:sp>
@@ -4038,7 +4116,125 @@
           <a:bodyPr/>
           <a:lstStyle/>
           <a:p>
-            <a:endParaRPr lang="en-US"/>
+            <a:pPr algn="ctr"/>
+            <a:r>
+              <a:rPr lang="en-US" dirty="0" smtClean="0"/>
+              <a:t>Current Production Schedule</a:t>
+            </a:r>
+            <a:endParaRPr lang="en-US" dirty="0"/>
+          </a:p>
+        </p:txBody>
+      </p:sp>
+      <p:pic>
+        <p:nvPicPr>
+          <p:cNvPr id="4" name="Content Placeholder 3"/>
+          <p:cNvPicPr>
+            <a:picLocks noGrp="1" noChangeAspect="1"/>
+          </p:cNvPicPr>
+          <p:nvPr>
+            <p:ph idx="1"/>
+          </p:nvPr>
+        </p:nvPicPr>
+        <p:blipFill>
+          <a:blip r:embed="rId2">
+            <a:extLst>
+              <a:ext uri="{28A0092B-C50C-407E-A947-70E740481C1C}">
+                <a14:useLocalDpi xmlns:a14="http://schemas.microsoft.com/office/drawing/2010/main" val="0"/>
+              </a:ext>
+            </a:extLst>
+          </a:blip>
+          <a:stretch>
+            <a:fillRect/>
+          </a:stretch>
+        </p:blipFill>
+        <p:spPr>
+          <a:xfrm>
+            <a:off x="1369681" y="2465965"/>
+            <a:ext cx="4753638" cy="3096057"/>
+          </a:xfrm>
+        </p:spPr>
+      </p:pic>
+      <p:pic>
+        <p:nvPicPr>
+          <p:cNvPr id="5" name="Picture 4"/>
+          <p:cNvPicPr>
+            <a:picLocks noChangeAspect="1"/>
+          </p:cNvPicPr>
+          <p:nvPr/>
+        </p:nvPicPr>
+        <p:blipFill>
+          <a:blip r:embed="rId3">
+            <a:extLst>
+              <a:ext uri="{28A0092B-C50C-407E-A947-70E740481C1C}">
+                <a14:useLocalDpi xmlns:a14="http://schemas.microsoft.com/office/drawing/2010/main" val="0"/>
+              </a:ext>
+            </a:extLst>
+          </a:blip>
+          <a:stretch>
+            <a:fillRect/>
+          </a:stretch>
+        </p:blipFill>
+        <p:spPr>
+          <a:xfrm>
+            <a:off x="6478587" y="2465965"/>
+            <a:ext cx="4443413" cy="3096057"/>
+          </a:xfrm>
+          <a:prstGeom prst="rect">
+            <a:avLst/>
+          </a:prstGeom>
+        </p:spPr>
+      </p:pic>
+    </p:spTree>
+    <p:extLst>
+      <p:ext uri="{BB962C8B-B14F-4D97-AF65-F5344CB8AC3E}">
+        <p14:creationId xmlns:p14="http://schemas.microsoft.com/office/powerpoint/2010/main" val="3284377727"/>
+      </p:ext>
+    </p:extLst>
+  </p:cSld>
+  <p:clrMapOvr>
+    <a:masterClrMapping/>
+  </p:clrMapOvr>
+</p:sld>
+</file>
+
+<file path=ppt/slides/slide8.xml><?xml version="1.0" encoding="utf-8"?>
+<p:sld xmlns:a="http://schemas.openxmlformats.org/drawingml/2006/main" xmlns:r="http://schemas.openxmlformats.org/officeDocument/2006/relationships" xmlns:p="http://schemas.openxmlformats.org/presentationml/2006/main">
+  <p:cSld>
+    <p:spTree>
+      <p:nvGrpSpPr>
+        <p:cNvPr id="1" name=""/>
+        <p:cNvGrpSpPr/>
+        <p:nvPr/>
+      </p:nvGrpSpPr>
+      <p:grpSpPr>
+        <a:xfrm>
+          <a:off x="0" y="0"/>
+          <a:ext cx="0" cy="0"/>
+          <a:chOff x="0" y="0"/>
+          <a:chExt cx="0" cy="0"/>
+        </a:xfrm>
+      </p:grpSpPr>
+      <p:sp>
+        <p:nvSpPr>
+          <p:cNvPr id="2" name="Title 1"/>
+          <p:cNvSpPr>
+            <a:spLocks noGrp="1"/>
+          </p:cNvSpPr>
+          <p:nvPr>
+            <p:ph type="title"/>
+          </p:nvPr>
+        </p:nvSpPr>
+        <p:spPr/>
+        <p:txBody>
+          <a:bodyPr/>
+          <a:lstStyle/>
+          <a:p>
+            <a:pPr algn="ctr"/>
+            <a:r>
+              <a:rPr lang="en-US" dirty="0" smtClean="0"/>
+              <a:t>The Explanatory Core</a:t>
+            </a:r>
+            <a:endParaRPr lang="en-US" dirty="0"/>
           </a:p>
         </p:txBody>
       </p:sp>

</xml_diff>